<commit_message>
le dossier nudge, le dossier template expé, le dosier cockpit (pas recadrer)
</commit_message>
<xml_diff>
--- a/experience/slides/realisation/C.pptx
+++ b/experience/slides/realisation/C.pptx
@@ -4316,8 +4316,8 @@
         </p:blipFill>
         <p:spPr>
           <a:xfrm>
-            <a:off x="517490" y="1"/>
-            <a:ext cx="4721672" cy="3242008"/>
+            <a:off x="520287" y="0"/>
+            <a:ext cx="4718876" cy="3240088"/>
           </a:xfrm>
           <a:prstGeom prst="rect">
             <a:avLst/>

</xml_diff>